<commit_message>
Added User Journey graph to Presentation Indd
</commit_message>
<xml_diff>
--- a/presentations/final-presentation-showtime-2024-01-17/Morpheus_Presentation.pptx
+++ b/presentations/final-presentation-showtime-2024-01-17/Morpheus_Presentation.pptx
@@ -7,6 +7,7 @@
   <p:sldIdLst>
     <p:sldId id="256" r:id="rId2"/>
     <p:sldId id="257" r:id="rId3"/>
+    <p:sldId id="258" r:id="rId4"/>
   </p:sldIdLst>
   <p:sldSz cx="12192000" cy="6858000"/>
   <p:notesSz cx="6858000" cy="9144000"/>
@@ -105,7 +106,64 @@
       </a:defRPr>
     </a:lvl9pPr>
   </p:defaultTextStyle>
+  <p:extLst>
+    <p:ext uri="{EFAFB233-063F-42B5-8137-9DF3F51BA10A}">
+      <p15:sldGuideLst xmlns:p15="http://schemas.microsoft.com/office/powerpoint/2012/main"/>
+    </p:ext>
+  </p:extLst>
 </p:presentation>
+</file>
+
+<file path=ppt/revisionInfo.xml><?xml version="1.0" encoding="utf-8"?>
+<p1510:revInfo xmlns:a="http://schemas.openxmlformats.org/drawingml/2006/main" xmlns:r="http://schemas.openxmlformats.org/officeDocument/2006/relationships" xmlns:p1510="http://schemas.microsoft.com/office/powerpoint/2015/10/main">
+  <p1510:revLst>
+    <p1510:client id="{E7792835-40AA-42BD-9714-56C54261BD55}" v="1" dt="2024-01-12T10:28:01.062"/>
+  </p1510:revLst>
+</p1510:revInfo>
+</file>
+
+<file path=ppt/changesInfos/changesInfo1.xml><?xml version="1.0" encoding="utf-8"?>
+<pc:chgInfo xmlns:a="http://schemas.openxmlformats.org/drawingml/2006/main" xmlns:r="http://schemas.openxmlformats.org/officeDocument/2006/relationships" xmlns:ac="http://schemas.microsoft.com/office/drawing/2013/main/command" xmlns:pc="http://schemas.microsoft.com/office/powerpoint/2013/main/command">
+  <pc:docChgLst>
+    <pc:chgData name="Chatir Adam" userId="b1050011-4919-420f-9cb1-a90ef466a44b" providerId="ADAL" clId="{E7792835-40AA-42BD-9714-56C54261BD55}"/>
+    <pc:docChg chg="undo custSel addSld modSld">
+      <pc:chgData name="Chatir Adam" userId="b1050011-4919-420f-9cb1-a90ef466a44b" providerId="ADAL" clId="{E7792835-40AA-42BD-9714-56C54261BD55}" dt="2024-01-12T10:28:36.843" v="5" actId="947"/>
+      <pc:docMkLst>
+        <pc:docMk/>
+      </pc:docMkLst>
+      <pc:sldChg chg="modSp mod">
+        <pc:chgData name="Chatir Adam" userId="b1050011-4919-420f-9cb1-a90ef466a44b" providerId="ADAL" clId="{E7792835-40AA-42BD-9714-56C54261BD55}" dt="2024-01-12T10:28:36.843" v="5" actId="947"/>
+        <pc:sldMkLst>
+          <pc:docMk/>
+          <pc:sldMk cId="2123046156" sldId="256"/>
+        </pc:sldMkLst>
+        <pc:spChg chg="mod">
+          <ac:chgData name="Chatir Adam" userId="b1050011-4919-420f-9cb1-a90ef466a44b" providerId="ADAL" clId="{E7792835-40AA-42BD-9714-56C54261BD55}" dt="2024-01-12T10:28:36.843" v="5" actId="947"/>
+          <ac:spMkLst>
+            <pc:docMk/>
+            <pc:sldMk cId="2123046156" sldId="256"/>
+            <ac:spMk id="6" creationId="{94AA65A4-4A28-0328-797F-3D7F16433EA3}"/>
+          </ac:spMkLst>
+        </pc:spChg>
+      </pc:sldChg>
+      <pc:sldChg chg="addSp modSp add mod">
+        <pc:chgData name="Chatir Adam" userId="b1050011-4919-420f-9cb1-a90ef466a44b" providerId="ADAL" clId="{E7792835-40AA-42BD-9714-56C54261BD55}" dt="2024-01-12T10:28:08.365" v="3" actId="14100"/>
+        <pc:sldMkLst>
+          <pc:docMk/>
+          <pc:sldMk cId="1356982369" sldId="258"/>
+        </pc:sldMkLst>
+        <pc:picChg chg="add mod">
+          <ac:chgData name="Chatir Adam" userId="b1050011-4919-420f-9cb1-a90ef466a44b" providerId="ADAL" clId="{E7792835-40AA-42BD-9714-56C54261BD55}" dt="2024-01-12T10:28:08.365" v="3" actId="14100"/>
+          <ac:picMkLst>
+            <pc:docMk/>
+            <pc:sldMk cId="1356982369" sldId="258"/>
+            <ac:picMk id="3" creationId="{A1A1FB63-A308-7807-38D5-720622DBBBC5}"/>
+          </ac:picMkLst>
+        </pc:picChg>
+      </pc:sldChg>
+    </pc:docChg>
+  </pc:docChgLst>
+</pc:chgInfo>
 </file>
 
 <file path=ppt/slideLayouts/slideLayout1.xml><?xml version="1.0" encoding="utf-8"?>
@@ -259,7 +317,7 @@
           <a:p>
             <a:fld id="{1922E79C-6F0F-4982-ACF3-689FABDA9483}" type="datetimeFigureOut">
               <a:rPr lang="fr-CH" smtClean="0"/>
-              <a:t>11.01.2024</a:t>
+              <a:t>12.01.2024</a:t>
             </a:fld>
             <a:endParaRPr lang="fr-CH"/>
           </a:p>
@@ -459,7 +517,7 @@
           <a:p>
             <a:fld id="{1922E79C-6F0F-4982-ACF3-689FABDA9483}" type="datetimeFigureOut">
               <a:rPr lang="fr-CH" smtClean="0"/>
-              <a:t>11.01.2024</a:t>
+              <a:t>12.01.2024</a:t>
             </a:fld>
             <a:endParaRPr lang="fr-CH"/>
           </a:p>
@@ -669,7 +727,7 @@
           <a:p>
             <a:fld id="{1922E79C-6F0F-4982-ACF3-689FABDA9483}" type="datetimeFigureOut">
               <a:rPr lang="fr-CH" smtClean="0"/>
-              <a:t>11.01.2024</a:t>
+              <a:t>12.01.2024</a:t>
             </a:fld>
             <a:endParaRPr lang="fr-CH"/>
           </a:p>
@@ -869,7 +927,7 @@
           <a:p>
             <a:fld id="{1922E79C-6F0F-4982-ACF3-689FABDA9483}" type="datetimeFigureOut">
               <a:rPr lang="fr-CH" smtClean="0"/>
-              <a:t>11.01.2024</a:t>
+              <a:t>12.01.2024</a:t>
             </a:fld>
             <a:endParaRPr lang="fr-CH"/>
           </a:p>
@@ -1145,7 +1203,7 @@
           <a:p>
             <a:fld id="{1922E79C-6F0F-4982-ACF3-689FABDA9483}" type="datetimeFigureOut">
               <a:rPr lang="fr-CH" smtClean="0"/>
-              <a:t>11.01.2024</a:t>
+              <a:t>12.01.2024</a:t>
             </a:fld>
             <a:endParaRPr lang="fr-CH"/>
           </a:p>
@@ -1413,7 +1471,7 @@
           <a:p>
             <a:fld id="{1922E79C-6F0F-4982-ACF3-689FABDA9483}" type="datetimeFigureOut">
               <a:rPr lang="fr-CH" smtClean="0"/>
-              <a:t>11.01.2024</a:t>
+              <a:t>12.01.2024</a:t>
             </a:fld>
             <a:endParaRPr lang="fr-CH"/>
           </a:p>
@@ -1828,7 +1886,7 @@
           <a:p>
             <a:fld id="{1922E79C-6F0F-4982-ACF3-689FABDA9483}" type="datetimeFigureOut">
               <a:rPr lang="fr-CH" smtClean="0"/>
-              <a:t>11.01.2024</a:t>
+              <a:t>12.01.2024</a:t>
             </a:fld>
             <a:endParaRPr lang="fr-CH"/>
           </a:p>
@@ -1970,7 +2028,7 @@
           <a:p>
             <a:fld id="{1922E79C-6F0F-4982-ACF3-689FABDA9483}" type="datetimeFigureOut">
               <a:rPr lang="fr-CH" smtClean="0"/>
-              <a:t>11.01.2024</a:t>
+              <a:t>12.01.2024</a:t>
             </a:fld>
             <a:endParaRPr lang="fr-CH"/>
           </a:p>
@@ -2083,7 +2141,7 @@
           <a:p>
             <a:fld id="{1922E79C-6F0F-4982-ACF3-689FABDA9483}" type="datetimeFigureOut">
               <a:rPr lang="fr-CH" smtClean="0"/>
-              <a:t>11.01.2024</a:t>
+              <a:t>12.01.2024</a:t>
             </a:fld>
             <a:endParaRPr lang="fr-CH"/>
           </a:p>
@@ -2396,7 +2454,7 @@
           <a:p>
             <a:fld id="{1922E79C-6F0F-4982-ACF3-689FABDA9483}" type="datetimeFigureOut">
               <a:rPr lang="fr-CH" smtClean="0"/>
-              <a:t>11.01.2024</a:t>
+              <a:t>12.01.2024</a:t>
             </a:fld>
             <a:endParaRPr lang="fr-CH"/>
           </a:p>
@@ -2685,7 +2743,7 @@
           <a:p>
             <a:fld id="{1922E79C-6F0F-4982-ACF3-689FABDA9483}" type="datetimeFigureOut">
               <a:rPr lang="fr-CH" smtClean="0"/>
-              <a:t>11.01.2024</a:t>
+              <a:t>12.01.2024</a:t>
             </a:fld>
             <a:endParaRPr lang="fr-CH"/>
           </a:p>
@@ -2933,7 +2991,7 @@
             <a:fld id="{1922E79C-6F0F-4982-ACF3-689FABDA9483}" type="datetimeFigureOut">
               <a:rPr lang="fr-CH" smtClean="0"/>
               <a:pPr/>
-              <a:t>11.01.2024</a:t>
+              <a:t>12.01.2024</a:t>
             </a:fld>
             <a:endParaRPr lang="fr-CH"/>
           </a:p>
@@ -3451,6 +3509,75 @@
 </p:sld>
 </file>
 
+<file path=ppt/slides/slide3.xml><?xml version="1.0" encoding="utf-8"?>
+<p:sld xmlns:a="http://schemas.openxmlformats.org/drawingml/2006/main" xmlns:r="http://schemas.openxmlformats.org/officeDocument/2006/relationships" xmlns:p="http://schemas.openxmlformats.org/presentationml/2006/main">
+  <p:cSld>
+    <p:spTree>
+      <p:nvGrpSpPr>
+        <p:cNvPr id="1" name=""/>
+        <p:cNvGrpSpPr/>
+        <p:nvPr/>
+      </p:nvGrpSpPr>
+      <p:grpSpPr>
+        <a:xfrm>
+          <a:off x="0" y="0"/>
+          <a:ext cx="0" cy="0"/>
+          <a:chOff x="0" y="0"/>
+          <a:chExt cx="0" cy="0"/>
+        </a:xfrm>
+      </p:grpSpPr>
+      <p:pic>
+        <p:nvPicPr>
+          <p:cNvPr id="3" name="Graphic 2">
+            <a:extLst>
+              <a:ext uri="{FF2B5EF4-FFF2-40B4-BE49-F238E27FC236}">
+                <a16:creationId xmlns:a16="http://schemas.microsoft.com/office/drawing/2014/main" id="{A1A1FB63-A308-7807-38D5-720622DBBBC5}"/>
+              </a:ext>
+            </a:extLst>
+          </p:cNvPr>
+          <p:cNvPicPr>
+            <a:picLocks noChangeAspect="1"/>
+          </p:cNvPicPr>
+          <p:nvPr/>
+        </p:nvPicPr>
+        <p:blipFill>
+          <a:blip r:embed="rId2">
+            <a:extLst>
+              <a:ext uri="{28A0092B-C50C-407E-A947-70E740481C1C}">
+                <a14:useLocalDpi xmlns:a14="http://schemas.microsoft.com/office/drawing/2010/main" val="0"/>
+              </a:ext>
+              <a:ext uri="{96DAC541-7B7A-43D3-8B79-37D633B846F1}">
+                <asvg:svgBlip xmlns:asvg="http://schemas.microsoft.com/office/drawing/2016/SVG/main" r:embed="rId3"/>
+              </a:ext>
+            </a:extLst>
+          </a:blip>
+          <a:stretch>
+            <a:fillRect/>
+          </a:stretch>
+        </p:blipFill>
+        <p:spPr>
+          <a:xfrm>
+            <a:off x="4791075" y="3348037"/>
+            <a:ext cx="2609850" cy="161925"/>
+          </a:xfrm>
+          <a:prstGeom prst="rect">
+            <a:avLst/>
+          </a:prstGeom>
+        </p:spPr>
+      </p:pic>
+    </p:spTree>
+    <p:extLst>
+      <p:ext uri="{BB962C8B-B14F-4D97-AF65-F5344CB8AC3E}">
+        <p14:creationId xmlns:p14="http://schemas.microsoft.com/office/powerpoint/2010/main" val="1356982369"/>
+      </p:ext>
+    </p:extLst>
+  </p:cSld>
+  <p:clrMapOvr>
+    <a:masterClrMapping/>
+  </p:clrMapOvr>
+</p:sld>
+</file>
+
 <file path=ppt/theme/theme1.xml><?xml version="1.0" encoding="utf-8"?>
 <a:theme xmlns:a="http://schemas.openxmlformats.org/drawingml/2006/main" name="Office Theme">
   <a:themeElements>

</xml_diff>